<commit_message>
Fixed typo in slide deck
</commit_message>
<xml_diff>
--- a/Content/Batch/Azure Batch and Batch Shipyard.pptx
+++ b/Content/Batch/Azure Batch and Batch Shipyard.pptx
@@ -1106,374 +1106,6 @@
       <dsp:cNvGrpSpPr/>
     </dsp:nvGrpSpPr>
     <dsp:grpSpPr/>
-    <dsp:sp modelId="{704C9B41-110E-4CB1-ABCB-9078ACF03904}">
-      <dsp:nvSpPr>
-        <dsp:cNvPr id="0" name=""/>
-        <dsp:cNvSpPr/>
-      </dsp:nvSpPr>
-      <dsp:spPr>
-        <a:xfrm>
-          <a:off x="0" y="1114081"/>
-          <a:ext cx="6152444" cy="3845277"/>
-        </a:xfrm>
-        <a:prstGeom prst="swooshArrow">
-          <a:avLst>
-            <a:gd name="adj1" fmla="val 25000"/>
-            <a:gd name="adj2" fmla="val 25000"/>
-          </a:avLst>
-        </a:prstGeom>
-        <a:solidFill>
-          <a:schemeClr val="accent1">
-            <a:tint val="40000"/>
-            <a:hueOff val="0"/>
-            <a:satOff val="0"/>
-            <a:lumOff val="0"/>
-            <a:alphaOff val="0"/>
-          </a:schemeClr>
-        </a:solidFill>
-        <a:ln>
-          <a:noFill/>
-        </a:ln>
-        <a:effectLst/>
-      </dsp:spPr>
-      <dsp:style>
-        <a:lnRef idx="0">
-          <a:scrgbClr r="0" g="0" b="0"/>
-        </a:lnRef>
-        <a:fillRef idx="1">
-          <a:scrgbClr r="0" g="0" b="0"/>
-        </a:fillRef>
-        <a:effectRef idx="0">
-          <a:scrgbClr r="0" g="0" b="0"/>
-        </a:effectRef>
-        <a:fontRef idx="minor"/>
-      </dsp:style>
-    </dsp:sp>
-    <dsp:sp modelId="{635334AD-75EF-4E20-AFC1-624BEAEF10BD}">
-      <dsp:nvSpPr>
-        <dsp:cNvPr id="0" name=""/>
-        <dsp:cNvSpPr/>
-      </dsp:nvSpPr>
-      <dsp:spPr>
-        <a:xfrm>
-          <a:off x="781360" y="3440705"/>
-          <a:ext cx="159963" cy="159963"/>
-        </a:xfrm>
-        <a:prstGeom prst="ellipse">
-          <a:avLst/>
-        </a:prstGeom>
-        <a:solidFill>
-          <a:schemeClr val="accent1">
-            <a:hueOff val="0"/>
-            <a:satOff val="0"/>
-            <a:lumOff val="0"/>
-            <a:alphaOff val="0"/>
-          </a:schemeClr>
-        </a:solidFill>
-        <a:ln w="25400" cap="flat" cmpd="sng" algn="ctr">
-          <a:solidFill>
-            <a:schemeClr val="lt1">
-              <a:hueOff val="0"/>
-              <a:satOff val="0"/>
-              <a:lumOff val="0"/>
-              <a:alphaOff val="0"/>
-            </a:schemeClr>
-          </a:solidFill>
-          <a:prstDash val="solid"/>
-        </a:ln>
-        <a:effectLst/>
-      </dsp:spPr>
-      <dsp:style>
-        <a:lnRef idx="2">
-          <a:scrgbClr r="0" g="0" b="0"/>
-        </a:lnRef>
-        <a:fillRef idx="1">
-          <a:scrgbClr r="0" g="0" b="0"/>
-        </a:fillRef>
-        <a:effectRef idx="0">
-          <a:scrgbClr r="0" g="0" b="0"/>
-        </a:effectRef>
-        <a:fontRef idx="minor">
-          <a:schemeClr val="lt1"/>
-        </a:fontRef>
-      </dsp:style>
-    </dsp:sp>
-    <dsp:sp modelId="{4982C738-0EED-467E-BFD0-0A5B6244D115}">
-      <dsp:nvSpPr>
-        <dsp:cNvPr id="0" name=""/>
-        <dsp:cNvSpPr/>
-      </dsp:nvSpPr>
-      <dsp:spPr>
-        <a:xfrm>
-          <a:off x="861342" y="3520687"/>
-          <a:ext cx="1433519" cy="1111285"/>
-        </a:xfrm>
-        <a:prstGeom prst="rect">
-          <a:avLst/>
-        </a:prstGeom>
-        <a:noFill/>
-        <a:ln>
-          <a:noFill/>
-        </a:ln>
-        <a:effectLst/>
-      </dsp:spPr>
-      <dsp:style>
-        <a:lnRef idx="0">
-          <a:scrgbClr r="0" g="0" b="0"/>
-        </a:lnRef>
-        <a:fillRef idx="0">
-          <a:scrgbClr r="0" g="0" b="0"/>
-        </a:fillRef>
-        <a:effectRef idx="0">
-          <a:scrgbClr r="0" g="0" b="0"/>
-        </a:effectRef>
-        <a:fontRef idx="minor"/>
-      </dsp:style>
-      <dsp:txBody>
-        <a:bodyPr spcFirstLastPara="0" vert="horz" wrap="square" lIns="84761" tIns="0" rIns="0" bIns="0" numCol="1" spcCol="1270" anchor="t" anchorCtr="0">
-          <a:noAutofit/>
-        </a:bodyPr>
-        <a:lstStyle/>
-        <a:p>
-          <a:pPr lvl="0" algn="l" defTabSz="933450">
-            <a:lnSpc>
-              <a:spcPct val="90000"/>
-            </a:lnSpc>
-            <a:spcBef>
-              <a:spcPct val="0"/>
-            </a:spcBef>
-            <a:spcAft>
-              <a:spcPct val="35000"/>
-            </a:spcAft>
-          </a:pPr>
-          <a:r>
-            <a:rPr lang="en-US" sz="2100" kern="1200" dirty="0" err="1"/>
-            <a:t>Dockerfiles</a:t>
-          </a:r>
-          <a:endParaRPr lang="en-US" sz="2100" kern="1200" dirty="0"/>
-        </a:p>
-      </dsp:txBody>
-      <dsp:txXfrm>
-        <a:off x="861342" y="3520687"/>
-        <a:ext cx="1433519" cy="1111285"/>
-      </dsp:txXfrm>
-    </dsp:sp>
-    <dsp:sp modelId="{76E57DE9-B9C3-4827-A924-0C94B509155F}">
-      <dsp:nvSpPr>
-        <dsp:cNvPr id="0" name=""/>
-        <dsp:cNvSpPr/>
-      </dsp:nvSpPr>
-      <dsp:spPr>
-        <a:xfrm>
-          <a:off x="2193346" y="2395558"/>
-          <a:ext cx="289164" cy="289164"/>
-        </a:xfrm>
-        <a:prstGeom prst="ellipse">
-          <a:avLst/>
-        </a:prstGeom>
-        <a:solidFill>
-          <a:schemeClr val="accent1">
-            <a:hueOff val="0"/>
-            <a:satOff val="0"/>
-            <a:lumOff val="0"/>
-            <a:alphaOff val="0"/>
-          </a:schemeClr>
-        </a:solidFill>
-        <a:ln w="25400" cap="flat" cmpd="sng" algn="ctr">
-          <a:solidFill>
-            <a:schemeClr val="lt1">
-              <a:hueOff val="0"/>
-              <a:satOff val="0"/>
-              <a:lumOff val="0"/>
-              <a:alphaOff val="0"/>
-            </a:schemeClr>
-          </a:solidFill>
-          <a:prstDash val="solid"/>
-        </a:ln>
-        <a:effectLst/>
-      </dsp:spPr>
-      <dsp:style>
-        <a:lnRef idx="2">
-          <a:scrgbClr r="0" g="0" b="0"/>
-        </a:lnRef>
-        <a:fillRef idx="1">
-          <a:scrgbClr r="0" g="0" b="0"/>
-        </a:fillRef>
-        <a:effectRef idx="0">
-          <a:scrgbClr r="0" g="0" b="0"/>
-        </a:effectRef>
-        <a:fontRef idx="minor">
-          <a:schemeClr val="lt1"/>
-        </a:fontRef>
-      </dsp:style>
-    </dsp:sp>
-    <dsp:sp modelId="{D20CD52C-EEB7-4D70-ACC1-27CFC1961DAE}">
-      <dsp:nvSpPr>
-        <dsp:cNvPr id="0" name=""/>
-        <dsp:cNvSpPr/>
-      </dsp:nvSpPr>
-      <dsp:spPr>
-        <a:xfrm>
-          <a:off x="2337928" y="2540141"/>
-          <a:ext cx="1476586" cy="2091830"/>
-        </a:xfrm>
-        <a:prstGeom prst="rect">
-          <a:avLst/>
-        </a:prstGeom>
-        <a:noFill/>
-        <a:ln>
-          <a:noFill/>
-        </a:ln>
-        <a:effectLst/>
-      </dsp:spPr>
-      <dsp:style>
-        <a:lnRef idx="0">
-          <a:scrgbClr r="0" g="0" b="0"/>
-        </a:lnRef>
-        <a:fillRef idx="0">
-          <a:scrgbClr r="0" g="0" b="0"/>
-        </a:fillRef>
-        <a:effectRef idx="0">
-          <a:scrgbClr r="0" g="0" b="0"/>
-        </a:effectRef>
-        <a:fontRef idx="minor"/>
-      </dsp:style>
-      <dsp:txBody>
-        <a:bodyPr spcFirstLastPara="0" vert="horz" wrap="square" lIns="153222" tIns="0" rIns="0" bIns="0" numCol="1" spcCol="1270" anchor="t" anchorCtr="0">
-          <a:noAutofit/>
-        </a:bodyPr>
-        <a:lstStyle/>
-        <a:p>
-          <a:pPr lvl="0" algn="l" defTabSz="933450">
-            <a:lnSpc>
-              <a:spcPct val="90000"/>
-            </a:lnSpc>
-            <a:spcBef>
-              <a:spcPct val="0"/>
-            </a:spcBef>
-            <a:spcAft>
-              <a:spcPct val="35000"/>
-            </a:spcAft>
-          </a:pPr>
-          <a:r>
-            <a:rPr lang="en-US" sz="2100" kern="1200" dirty="0"/>
-            <a:t>Batch Shipyard</a:t>
-          </a:r>
-        </a:p>
-      </dsp:txBody>
-      <dsp:txXfrm>
-        <a:off x="2337928" y="2540141"/>
-        <a:ext cx="1476586" cy="2091830"/>
-      </dsp:txXfrm>
-    </dsp:sp>
-    <dsp:sp modelId="{7DC371A7-55AA-4617-B194-F621850EB750}">
-      <dsp:nvSpPr>
-        <dsp:cNvPr id="0" name=""/>
-        <dsp:cNvSpPr/>
-      </dsp:nvSpPr>
-      <dsp:spPr>
-        <a:xfrm>
-          <a:off x="3891420" y="1759549"/>
-          <a:ext cx="399908" cy="399908"/>
-        </a:xfrm>
-        <a:prstGeom prst="ellipse">
-          <a:avLst/>
-        </a:prstGeom>
-        <a:solidFill>
-          <a:schemeClr val="accent1">
-            <a:hueOff val="0"/>
-            <a:satOff val="0"/>
-            <a:lumOff val="0"/>
-            <a:alphaOff val="0"/>
-          </a:schemeClr>
-        </a:solidFill>
-        <a:ln w="25400" cap="flat" cmpd="sng" algn="ctr">
-          <a:solidFill>
-            <a:schemeClr val="lt1">
-              <a:hueOff val="0"/>
-              <a:satOff val="0"/>
-              <a:lumOff val="0"/>
-              <a:alphaOff val="0"/>
-            </a:schemeClr>
-          </a:solidFill>
-          <a:prstDash val="solid"/>
-        </a:ln>
-        <a:effectLst/>
-      </dsp:spPr>
-      <dsp:style>
-        <a:lnRef idx="2">
-          <a:scrgbClr r="0" g="0" b="0"/>
-        </a:lnRef>
-        <a:fillRef idx="1">
-          <a:scrgbClr r="0" g="0" b="0"/>
-        </a:fillRef>
-        <a:effectRef idx="0">
-          <a:scrgbClr r="0" g="0" b="0"/>
-        </a:effectRef>
-        <a:fontRef idx="minor">
-          <a:schemeClr val="lt1"/>
-        </a:fontRef>
-      </dsp:style>
-    </dsp:sp>
-    <dsp:sp modelId="{B72AC980-ADB3-4B44-83A2-C43BBA3CB84A}">
-      <dsp:nvSpPr>
-        <dsp:cNvPr id="0" name=""/>
-        <dsp:cNvSpPr/>
-      </dsp:nvSpPr>
-      <dsp:spPr>
-        <a:xfrm>
-          <a:off x="4091375" y="1959504"/>
-          <a:ext cx="1476586" cy="2672467"/>
-        </a:xfrm>
-        <a:prstGeom prst="rect">
-          <a:avLst/>
-        </a:prstGeom>
-        <a:noFill/>
-        <a:ln>
-          <a:noFill/>
-        </a:ln>
-        <a:effectLst/>
-      </dsp:spPr>
-      <dsp:style>
-        <a:lnRef idx="0">
-          <a:scrgbClr r="0" g="0" b="0"/>
-        </a:lnRef>
-        <a:fillRef idx="0">
-          <a:scrgbClr r="0" g="0" b="0"/>
-        </a:fillRef>
-        <a:effectRef idx="0">
-          <a:scrgbClr r="0" g="0" b="0"/>
-        </a:effectRef>
-        <a:fontRef idx="minor"/>
-      </dsp:style>
-      <dsp:txBody>
-        <a:bodyPr spcFirstLastPara="0" vert="horz" wrap="square" lIns="211903" tIns="0" rIns="0" bIns="0" numCol="1" spcCol="1270" anchor="t" anchorCtr="0">
-          <a:noAutofit/>
-        </a:bodyPr>
-        <a:lstStyle/>
-        <a:p>
-          <a:pPr lvl="0" algn="l" defTabSz="933450">
-            <a:lnSpc>
-              <a:spcPct val="90000"/>
-            </a:lnSpc>
-            <a:spcBef>
-              <a:spcPct val="0"/>
-            </a:spcBef>
-            <a:spcAft>
-              <a:spcPct val="35000"/>
-            </a:spcAft>
-          </a:pPr>
-          <a:r>
-            <a:rPr lang="en-US" sz="2100" kern="1200" dirty="0"/>
-            <a:t>Become a Batch Ninja</a:t>
-          </a:r>
-        </a:p>
-      </dsp:txBody>
-      <dsp:txXfrm>
-        <a:off x="4091375" y="1959504"/>
-        <a:ext cx="1476586" cy="2672467"/>
-      </dsp:txXfrm>
-    </dsp:sp>
   </dsp:spTree>
 </dsp:drawing>
 </file>
@@ -16170,12 +15802,8 @@
               <a:t>Cloud-scale job scheduling and compute management </a:t>
             </a:r>
             <a:r>
-              <a:rPr lang="en-US" dirty="0" err="1" smtClean="0"/>
-              <a:t>scainge</a:t>
-            </a:r>
-            <a:r>
               <a:rPr lang="en-US" dirty="0" smtClean="0"/>
-              <a:t> </a:t>
+              <a:t>scaling </a:t>
             </a:r>
             <a:r>
               <a:rPr lang="en-US" dirty="0"/>
@@ -18422,11 +18050,7 @@
             </a:r>
             <a:r>
               <a:rPr lang="en-US" sz="3200" dirty="0" smtClean="0"/>
-              <a:t>constitute </a:t>
-            </a:r>
-            <a:r>
-              <a:rPr lang="en-US" sz="3200" dirty="0" smtClean="0"/>
-              <a:t>a </a:t>
+              <a:t>constitute a </a:t>
             </a:r>
             <a:r>
               <a:rPr lang="en-US" sz="3200" dirty="0"/>
@@ -18559,11 +18183,7 @@
             </a:r>
             <a:r>
               <a:rPr lang="en-US" sz="2800" dirty="0" smtClean="0"/>
-              <a:t>must </a:t>
-            </a:r>
-            <a:r>
-              <a:rPr lang="en-US" sz="2800" dirty="0" smtClean="0"/>
-              <a:t>be </a:t>
+              <a:t>must be </a:t>
             </a:r>
             <a:r>
               <a:rPr lang="en-US" sz="2800" dirty="0"/>
@@ -21635,11 +21255,7 @@
             </a:r>
             <a:r>
               <a:rPr lang="en-US" sz="2800" dirty="0" smtClean="0"/>
-              <a:t>is </a:t>
-            </a:r>
-            <a:r>
-              <a:rPr lang="en-US" sz="2800" dirty="0" smtClean="0"/>
-              <a:t>most helpful</a:t>
+              <a:t>is most helpful</a:t>
             </a:r>
             <a:endParaRPr lang="en-US" sz="2800" dirty="0"/>
           </a:p>

</xml_diff>